<commit_message>
Additional updates for serializer settings
Etc.
</commit_message>
<xml_diff>
--- a/Slides/Module 3 - Web API Configuration.pptx
+++ b/Slides/Module 3 - Web API Configuration.pptx
@@ -213,7 +213,7 @@
           <a:p>
             <a:fld id="{312E7B4A-039C-48A2-9B2C-AF16AA3873D8}" type="datetimeFigureOut">
               <a:rPr lang="en-US" smtClean="0"/>
-              <a:t>1/3/2015</a:t>
+              <a:t>1/5/2015</a:t>
             </a:fld>
             <a:endParaRPr lang="en-US"/>
           </a:p>
@@ -378,7 +378,7 @@
           <a:p>
             <a:fld id="{DA005A0C-54D9-45AA-87D4-C551D08DFCE1}" type="datetimeFigureOut">
               <a:rPr lang="en-US" smtClean="0"/>
-              <a:t>1/3/2015</a:t>
+              <a:t>1/5/2015</a:t>
             </a:fld>
             <a:endParaRPr lang="en-US"/>
           </a:p>
@@ -4685,6 +4685,30 @@
           </a:p>
         </p:txBody>
       </p:sp>
+      <p:pic>
+        <p:nvPicPr>
+          <p:cNvPr id="5" name="Picture 4"/>
+          <p:cNvPicPr>
+            <a:picLocks noChangeAspect="1"/>
+          </p:cNvPicPr>
+          <p:nvPr/>
+        </p:nvPicPr>
+        <p:blipFill>
+          <a:blip r:embed="rId2"/>
+          <a:stretch>
+            <a:fillRect/>
+          </a:stretch>
+        </p:blipFill>
+        <p:spPr>
+          <a:xfrm>
+            <a:off x="2939650" y="2723721"/>
+            <a:ext cx="6404159" cy="3764119"/>
+          </a:xfrm>
+          <a:prstGeom prst="rect">
+            <a:avLst/>
+          </a:prstGeom>
+        </p:spPr>
+      </p:pic>
     </p:spTree>
     <p:extLst>
       <p:ext uri="{BB962C8B-B14F-4D97-AF65-F5344CB8AC3E}">
@@ -6015,6 +6039,28 @@
 </file>
 
 <file path=customXml/item1.xml><?xml version="1.0" encoding="utf-8"?>
+<p:properties xmlns:p="http://schemas.microsoft.com/office/2006/metadata/properties" xmlns:xsi="http://www.w3.org/2001/XMLSchema-instance" xmlns:pc="http://schemas.microsoft.com/office/infopath/2007/PartnerControls">
+  <documentManagement>
+    <TaxCatchAll xmlns="230e9df3-be65-4c73-a93b-d1236ebd677e"/>
+    <PublishingExpirationDate xmlns="http://schemas.microsoft.com/sharepoint/v3" xsi:nil="true"/>
+    <PublishingStartDate xmlns="http://schemas.microsoft.com/sharepoint/v3" xsi:nil="true"/>
+    <TaxKeywordTaxHTField xmlns="230e9df3-be65-4c73-a93b-d1236ebd677e">
+      <Terms xmlns="http://schemas.microsoft.com/office/infopath/2007/PartnerControls"/>
+    </TaxKeywordTaxHTField>
+  </documentManagement>
+</p:properties>
+</file>
+
+<file path=customXml/item2.xml><?xml version="1.0" encoding="utf-8"?>
+<?mso-contentType ?>
+<FormTemplates xmlns="http://schemas.microsoft.com/sharepoint/v3/contenttype/forms">
+  <Display>DocumentLibraryForm</Display>
+  <Edit>DocumentLibraryForm</Edit>
+  <New>DocumentLibraryForm</New>
+</FormTemplates>
+</file>
+
+<file path=customXml/item3.xml><?xml version="1.0" encoding="utf-8"?>
 <ct:contentTypeSchema xmlns:ct="http://schemas.microsoft.com/office/2006/metadata/contentType" xmlns:ma="http://schemas.microsoft.com/office/2006/metadata/properties/metaAttributes" ct:_="" ma:_="" ma:contentTypeName="Document" ma:contentTypeID="0x010100496889825850D44592AC5D2F43187AE4" ma:contentTypeVersion="5" ma:contentTypeDescription="Create a new document." ma:contentTypeScope="" ma:versionID="fde90edb5a63ba841bca516fd2abaf95">
   <xsd:schema xmlns:xsd="http://www.w3.org/2001/XMLSchema" xmlns:xs="http://www.w3.org/2001/XMLSchema" xmlns:p="http://schemas.microsoft.com/office/2006/metadata/properties" xmlns:ns1="http://schemas.microsoft.com/sharepoint/v3" xmlns:ns2="230e9df3-be65-4c73-a93b-d1236ebd677e" xmlns:ns3="27aa9422-7f1f-4c84-9cdf-302b1a67e513" targetNamespace="http://schemas.microsoft.com/office/2006/metadata/properties" ma:root="true" ma:fieldsID="5e7808ae941cc340dbe51a3031959734" ns1:_="" ns2:_="" ns3:_="">
     <xsd:import namespace="http://schemas.microsoft.com/sharepoint/v3"/>
@@ -6196,29 +6242,33 @@
 </ct:contentTypeSchema>
 </file>
 
-<file path=customXml/item2.xml><?xml version="1.0" encoding="utf-8"?>
-<?mso-contentType ?>
-<FormTemplates xmlns="http://schemas.microsoft.com/sharepoint/v3/contenttype/forms">
-  <Display>DocumentLibraryForm</Display>
-  <Edit>DocumentLibraryForm</Edit>
-  <New>DocumentLibraryForm</New>
-</FormTemplates>
+<file path=customXml/itemProps1.xml><?xml version="1.0" encoding="utf-8"?>
+<ds:datastoreItem xmlns:ds="http://schemas.openxmlformats.org/officeDocument/2006/customXml" ds:itemID="{7025FDD9-4C58-4084-9F89-0E6ADD6FFF55}">
+  <ds:schemaRefs>
+    <ds:schemaRef ds:uri="27aa9422-7f1f-4c84-9cdf-302b1a67e513"/>
+    <ds:schemaRef ds:uri="http://schemas.microsoft.com/office/2006/documentManagement/types"/>
+    <ds:schemaRef ds:uri="http://schemas.microsoft.com/office/2006/metadata/properties"/>
+    <ds:schemaRef ds:uri="http://purl.org/dc/elements/1.1/"/>
+    <ds:schemaRef ds:uri="230e9df3-be65-4c73-a93b-d1236ebd677e"/>
+    <ds:schemaRef ds:uri="http://purl.org/dc/terms/"/>
+    <ds:schemaRef ds:uri="http://schemas.openxmlformats.org/package/2006/metadata/core-properties"/>
+    <ds:schemaRef ds:uri="http://purl.org/dc/dcmitype/"/>
+    <ds:schemaRef ds:uri="http://schemas.microsoft.com/office/infopath/2007/PartnerControls"/>
+    <ds:schemaRef ds:uri="http://schemas.microsoft.com/sharepoint/v3"/>
+    <ds:schemaRef ds:uri="http://www.w3.org/XML/1998/namespace"/>
+  </ds:schemaRefs>
+</ds:datastoreItem>
 </file>
 
-<file path=customXml/item3.xml><?xml version="1.0" encoding="utf-8"?>
-<p:properties xmlns:p="http://schemas.microsoft.com/office/2006/metadata/properties" xmlns:xsi="http://www.w3.org/2001/XMLSchema-instance" xmlns:pc="http://schemas.microsoft.com/office/infopath/2007/PartnerControls">
-  <documentManagement>
-    <TaxCatchAll xmlns="230e9df3-be65-4c73-a93b-d1236ebd677e"/>
-    <PublishingExpirationDate xmlns="http://schemas.microsoft.com/sharepoint/v3" xsi:nil="true"/>
-    <PublishingStartDate xmlns="http://schemas.microsoft.com/sharepoint/v3" xsi:nil="true"/>
-    <TaxKeywordTaxHTField xmlns="230e9df3-be65-4c73-a93b-d1236ebd677e">
-      <Terms xmlns="http://schemas.microsoft.com/office/infopath/2007/PartnerControls"/>
-    </TaxKeywordTaxHTField>
-  </documentManagement>
-</p:properties>
+<file path=customXml/itemProps2.xml><?xml version="1.0" encoding="utf-8"?>
+<ds:datastoreItem xmlns:ds="http://schemas.openxmlformats.org/officeDocument/2006/customXml" ds:itemID="{B0CA13EC-1D3C-4D6F-8D1C-E8A452CFC79A}">
+  <ds:schemaRefs>
+    <ds:schemaRef ds:uri="http://schemas.microsoft.com/sharepoint/v3/contenttype/forms"/>
+  </ds:schemaRefs>
+</ds:datastoreItem>
 </file>
 
-<file path=customXml/itemProps1.xml><?xml version="1.0" encoding="utf-8"?>
+<file path=customXml/itemProps3.xml><?xml version="1.0" encoding="utf-8"?>
 <ds:datastoreItem xmlns:ds="http://schemas.openxmlformats.org/officeDocument/2006/customXml" ds:itemID="{3253B29C-1CCD-4FE8-A1C4-023A0910DF96}">
   <ds:schemaRefs>
     <ds:schemaRef ds:uri="http://schemas.microsoft.com/office/2006/metadata/contentType"/>
@@ -6236,30 +6286,4 @@
     <ds:schemaRef ds:uri="http://schemas.microsoft.com/internal/obd"/>
   </ds:schemaRefs>
 </ds:datastoreItem>
-</file>
-
-<file path=customXml/itemProps2.xml><?xml version="1.0" encoding="utf-8"?>
-<ds:datastoreItem xmlns:ds="http://schemas.openxmlformats.org/officeDocument/2006/customXml" ds:itemID="{B0CA13EC-1D3C-4D6F-8D1C-E8A452CFC79A}">
-  <ds:schemaRefs>
-    <ds:schemaRef ds:uri="http://schemas.microsoft.com/sharepoint/v3/contenttype/forms"/>
-  </ds:schemaRefs>
-</ds:datastoreItem>
-</file>
-
-<file path=customXml/itemProps3.xml><?xml version="1.0" encoding="utf-8"?>
-<ds:datastoreItem xmlns:ds="http://schemas.openxmlformats.org/officeDocument/2006/customXml" ds:itemID="{7025FDD9-4C58-4084-9F89-0E6ADD6FFF55}">
-  <ds:schemaRefs>
-    <ds:schemaRef ds:uri="27aa9422-7f1f-4c84-9cdf-302b1a67e513"/>
-    <ds:schemaRef ds:uri="http://schemas.microsoft.com/office/2006/documentManagement/types"/>
-    <ds:schemaRef ds:uri="http://schemas.microsoft.com/office/2006/metadata/properties"/>
-    <ds:schemaRef ds:uri="http://purl.org/dc/elements/1.1/"/>
-    <ds:schemaRef ds:uri="230e9df3-be65-4c73-a93b-d1236ebd677e"/>
-    <ds:schemaRef ds:uri="http://purl.org/dc/terms/"/>
-    <ds:schemaRef ds:uri="http://schemas.openxmlformats.org/package/2006/metadata/core-properties"/>
-    <ds:schemaRef ds:uri="http://purl.org/dc/dcmitype/"/>
-    <ds:schemaRef ds:uri="http://schemas.microsoft.com/office/infopath/2007/PartnerControls"/>
-    <ds:schemaRef ds:uri="http://schemas.microsoft.com/sharepoint/v3"/>
-    <ds:schemaRef ds:uri="http://www.w3.org/XML/1998/namespace"/>
-  </ds:schemaRefs>
-</ds:datastoreItem>
 </file>
</xml_diff>

<commit_message>
Add examples for routes and actions
Added examples and extended deck
</commit_message>
<xml_diff>
--- a/Slides/Module 3 - Web API Configuration.pptx
+++ b/Slides/Module 3 - Web API Configuration.pptx
@@ -5,10 +5,10 @@
     <p:sldMasterId id="2147483660" r:id="rId4"/>
   </p:sldMasterIdLst>
   <p:notesMasterIdLst>
-    <p:notesMasterId r:id="rId16"/>
+    <p:notesMasterId r:id="rId18"/>
   </p:notesMasterIdLst>
   <p:handoutMasterIdLst>
-    <p:handoutMasterId r:id="rId17"/>
+    <p:handoutMasterId r:id="rId19"/>
   </p:handoutMasterIdLst>
   <p:sldIdLst>
     <p:sldId id="277" r:id="rId5"/>
@@ -18,10 +18,12 @@
     <p:sldId id="293" r:id="rId9"/>
     <p:sldId id="297" r:id="rId10"/>
     <p:sldId id="294" r:id="rId11"/>
-    <p:sldId id="283" r:id="rId12"/>
-    <p:sldId id="295" r:id="rId13"/>
-    <p:sldId id="292" r:id="rId14"/>
-    <p:sldId id="269" r:id="rId15"/>
+    <p:sldId id="298" r:id="rId12"/>
+    <p:sldId id="283" r:id="rId13"/>
+    <p:sldId id="299" r:id="rId14"/>
+    <p:sldId id="295" r:id="rId15"/>
+    <p:sldId id="292" r:id="rId16"/>
+    <p:sldId id="269" r:id="rId17"/>
   </p:sldIdLst>
   <p:sldSz cx="12192000" cy="6858000"/>
   <p:notesSz cx="6858000" cy="9144000"/>
@@ -213,7 +215,7 @@
           <a:p>
             <a:fld id="{312E7B4A-039C-48A2-9B2C-AF16AA3873D8}" type="datetimeFigureOut">
               <a:rPr lang="en-US" smtClean="0"/>
-              <a:t>1/5/2015</a:t>
+              <a:t>1/6/2015</a:t>
             </a:fld>
             <a:endParaRPr lang="en-US"/>
           </a:p>
@@ -378,7 +380,7 @@
           <a:p>
             <a:fld id="{DA005A0C-54D9-45AA-87D4-C551D08DFCE1}" type="datetimeFigureOut">
               <a:rPr lang="en-US" smtClean="0"/>
-              <a:t>1/5/2015</a:t>
+              <a:t>1/6/2015</a:t>
             </a:fld>
             <a:endParaRPr lang="en-US"/>
           </a:p>
@@ -1046,7 +1048,7 @@
           <a:p>
             <a:r>
               <a:rPr lang="en-US" dirty="0" smtClean="0"/>
-              <a:t>https://developer.github.com/v3/ -&gt; start at https://api.github.com/users/jeremylikness and drill down</a:t>
+              <a:t>03bRoutingActions</a:t>
             </a:r>
             <a:endParaRPr lang="en-US" dirty="0"/>
           </a:p>
@@ -1070,6 +1072,94 @@
             <a:fld id="{4CFD207A-07DF-40AD-A916-9872E089CE7A}" type="slidenum">
               <a:rPr lang="en-US" smtClean="0"/>
               <a:t>10</a:t>
+            </a:fld>
+            <a:endParaRPr lang="en-US"/>
+          </a:p>
+        </p:txBody>
+      </p:sp>
+    </p:spTree>
+    <p:extLst>
+      <p:ext uri="{BB962C8B-B14F-4D97-AF65-F5344CB8AC3E}">
+        <p14:creationId xmlns:p14="http://schemas.microsoft.com/office/powerpoint/2010/main" val="1207437073"/>
+      </p:ext>
+    </p:extLst>
+  </p:cSld>
+  <p:clrMapOvr>
+    <a:masterClrMapping/>
+  </p:clrMapOvr>
+</p:notes>
+</file>
+
+<file path=ppt/notesSlides/notesSlide6.xml><?xml version="1.0" encoding="utf-8"?>
+<p:notes xmlns:a="http://schemas.openxmlformats.org/drawingml/2006/main" xmlns:r="http://schemas.openxmlformats.org/officeDocument/2006/relationships" xmlns:p="http://schemas.openxmlformats.org/presentationml/2006/main">
+  <p:cSld>
+    <p:spTree>
+      <p:nvGrpSpPr>
+        <p:cNvPr id="1" name=""/>
+        <p:cNvGrpSpPr/>
+        <p:nvPr/>
+      </p:nvGrpSpPr>
+      <p:grpSpPr>
+        <a:xfrm>
+          <a:off x="0" y="0"/>
+          <a:ext cx="0" cy="0"/>
+          <a:chOff x="0" y="0"/>
+          <a:chExt cx="0" cy="0"/>
+        </a:xfrm>
+      </p:grpSpPr>
+      <p:sp>
+        <p:nvSpPr>
+          <p:cNvPr id="2" name="Slide Image Placeholder 1"/>
+          <p:cNvSpPr>
+            <a:spLocks noGrp="1" noRot="1" noChangeAspect="1"/>
+          </p:cNvSpPr>
+          <p:nvPr>
+            <p:ph type="sldImg"/>
+          </p:nvPr>
+        </p:nvSpPr>
+        <p:spPr/>
+      </p:sp>
+      <p:sp>
+        <p:nvSpPr>
+          <p:cNvPr id="3" name="Notes Placeholder 2"/>
+          <p:cNvSpPr>
+            <a:spLocks noGrp="1"/>
+          </p:cNvSpPr>
+          <p:nvPr>
+            <p:ph type="body" idx="1"/>
+          </p:nvPr>
+        </p:nvSpPr>
+        <p:spPr/>
+        <p:txBody>
+          <a:bodyPr/>
+          <a:lstStyle/>
+          <a:p>
+            <a:r>
+              <a:rPr lang="en-US" dirty="0" smtClean="0"/>
+              <a:t>https://developer.github.com/v3/ -&gt; start at https://api.github.com/users/jeremylikness and drill down</a:t>
+            </a:r>
+            <a:endParaRPr lang="en-US" dirty="0"/>
+          </a:p>
+        </p:txBody>
+      </p:sp>
+      <p:sp>
+        <p:nvSpPr>
+          <p:cNvPr id="4" name="Slide Number Placeholder 3"/>
+          <p:cNvSpPr>
+            <a:spLocks noGrp="1"/>
+          </p:cNvSpPr>
+          <p:nvPr>
+            <p:ph type="sldNum" sz="quarter" idx="10"/>
+          </p:nvPr>
+        </p:nvSpPr>
+        <p:spPr/>
+        <p:txBody>
+          <a:bodyPr/>
+          <a:lstStyle/>
+          <a:p>
+            <a:fld id="{4CFD207A-07DF-40AD-A916-9872E089CE7A}" type="slidenum">
+              <a:rPr lang="en-US" smtClean="0"/>
+              <a:t>12</a:t>
             </a:fld>
             <a:endParaRPr lang="en-US"/>
           </a:p>
@@ -4001,6 +4091,315 @@
           <a:p>
             <a:r>
               <a:rPr lang="en-US" b="1" dirty="0" smtClean="0"/>
+              <a:t>Routing and Actions</a:t>
+            </a:r>
+            <a:endParaRPr lang="en-US" dirty="0"/>
+          </a:p>
+        </p:txBody>
+      </p:sp>
+      <p:sp>
+        <p:nvSpPr>
+          <p:cNvPr id="4" name="TextBox 3"/>
+          <p:cNvSpPr txBox="1"/>
+          <p:nvPr/>
+        </p:nvSpPr>
+        <p:spPr>
+          <a:xfrm>
+            <a:off x="9906000" y="-1"/>
+            <a:ext cx="2286000" cy="2031325"/>
+          </a:xfrm>
+          <a:prstGeom prst="rect">
+            <a:avLst/>
+          </a:prstGeom>
+          <a:solidFill>
+            <a:srgbClr val="FFFF00"/>
+          </a:solidFill>
+          <a:ln>
+            <a:noFill/>
+          </a:ln>
+        </p:spPr>
+        <p:txBody>
+          <a:bodyPr wrap="square" rtlCol="0">
+            <a:spAutoFit/>
+          </a:bodyPr>
+          <a:lstStyle/>
+          <a:p>
+            <a:pPr algn="ctr"/>
+            <a:endParaRPr lang="en-US" dirty="0" smtClean="0"/>
+          </a:p>
+          <a:p>
+            <a:pPr algn="ctr"/>
+            <a:endParaRPr lang="en-US" dirty="0"/>
+          </a:p>
+          <a:p>
+            <a:pPr algn="ctr"/>
+            <a:r>
+              <a:rPr lang="en-US" dirty="0" smtClean="0"/>
+              <a:t>Please leave this area blank to allow for picture in picture recording</a:t>
+            </a:r>
+          </a:p>
+          <a:p>
+            <a:pPr algn="ctr"/>
+            <a:endParaRPr lang="en-US" dirty="0"/>
+          </a:p>
+        </p:txBody>
+      </p:sp>
+    </p:spTree>
+    <p:extLst>
+      <p:ext uri="{BB962C8B-B14F-4D97-AF65-F5344CB8AC3E}">
+        <p14:creationId xmlns:p14="http://schemas.microsoft.com/office/powerpoint/2010/main" val="2278851224"/>
+      </p:ext>
+    </p:extLst>
+  </p:cSld>
+  <p:clrMapOvr>
+    <a:masterClrMapping/>
+  </p:clrMapOvr>
+  <p:timing>
+    <p:tnLst>
+      <p:par>
+        <p:cTn id="1" dur="indefinite" restart="never" nodeType="tmRoot"/>
+      </p:par>
+    </p:tnLst>
+  </p:timing>
+</p:sld>
+</file>
+
+<file path=ppt/slides/slide11.xml><?xml version="1.0" encoding="utf-8"?>
+<p:sld xmlns:a="http://schemas.openxmlformats.org/drawingml/2006/main" xmlns:r="http://schemas.openxmlformats.org/officeDocument/2006/relationships" xmlns:p="http://schemas.openxmlformats.org/presentationml/2006/main">
+  <p:cSld>
+    <p:spTree>
+      <p:nvGrpSpPr>
+        <p:cNvPr id="1" name=""/>
+        <p:cNvGrpSpPr/>
+        <p:nvPr/>
+      </p:nvGrpSpPr>
+      <p:grpSpPr>
+        <a:xfrm>
+          <a:off x="0" y="0"/>
+          <a:ext cx="0" cy="0"/>
+          <a:chOff x="0" y="0"/>
+          <a:chExt cx="0" cy="0"/>
+        </a:xfrm>
+      </p:grpSpPr>
+      <p:sp>
+        <p:nvSpPr>
+          <p:cNvPr id="2" name="Title 1"/>
+          <p:cNvSpPr>
+            <a:spLocks noGrp="1"/>
+          </p:cNvSpPr>
+          <p:nvPr>
+            <p:ph type="title"/>
+          </p:nvPr>
+        </p:nvSpPr>
+        <p:spPr/>
+        <p:txBody>
+          <a:bodyPr/>
+          <a:lstStyle/>
+          <a:p>
+            <a:r>
+              <a:rPr lang="en-US" dirty="0" smtClean="0"/>
+              <a:t>Custom Content Negotiation</a:t>
+            </a:r>
+            <a:endParaRPr lang="en-US" dirty="0"/>
+          </a:p>
+        </p:txBody>
+      </p:sp>
+      <p:sp>
+        <p:nvSpPr>
+          <p:cNvPr id="3" name="Content Placeholder 2"/>
+          <p:cNvSpPr>
+            <a:spLocks noGrp="1"/>
+          </p:cNvSpPr>
+          <p:nvPr>
+            <p:ph sz="quarter" idx="10"/>
+          </p:nvPr>
+        </p:nvSpPr>
+        <p:spPr/>
+        <p:txBody>
+          <a:bodyPr/>
+          <a:lstStyle/>
+          <a:p>
+            <a:r>
+              <a:rPr lang="en-US" dirty="0" err="1" smtClean="0"/>
+              <a:t>MediaTypeMappings</a:t>
+            </a:r>
+            <a:r>
+              <a:rPr lang="en-US" dirty="0" smtClean="0"/>
+              <a:t> </a:t>
+            </a:r>
+          </a:p>
+          <a:p>
+            <a:pPr lvl="1"/>
+            <a:r>
+              <a:rPr lang="en-US" dirty="0" err="1" smtClean="0"/>
+              <a:t>QueryStringMapping</a:t>
+            </a:r>
+            <a:r>
+              <a:rPr lang="en-US" dirty="0" smtClean="0"/>
+              <a:t> </a:t>
+            </a:r>
+          </a:p>
+          <a:p>
+            <a:pPr lvl="1"/>
+            <a:r>
+              <a:rPr lang="en-US" dirty="0" err="1" smtClean="0"/>
+              <a:t>UriPathExtensionMapping</a:t>
+            </a:r>
+            <a:r>
+              <a:rPr lang="en-US" dirty="0" smtClean="0"/>
+              <a:t> </a:t>
+            </a:r>
+          </a:p>
+          <a:p>
+            <a:pPr lvl="1"/>
+            <a:r>
+              <a:rPr lang="en-US" dirty="0" err="1" smtClean="0"/>
+              <a:t>RequestHeaderMapping</a:t>
+            </a:r>
+            <a:endParaRPr lang="en-US" dirty="0" smtClean="0"/>
+          </a:p>
+          <a:p>
+            <a:r>
+              <a:rPr lang="en-US" dirty="0" smtClean="0"/>
+              <a:t>Own Formatter</a:t>
+            </a:r>
+          </a:p>
+          <a:p>
+            <a:pPr lvl="1"/>
+            <a:r>
+              <a:rPr lang="en-US" dirty="0" smtClean="0"/>
+              <a:t>Derive from default, override </a:t>
+            </a:r>
+            <a:r>
+              <a:rPr lang="en-US" dirty="0" err="1" smtClean="0"/>
+              <a:t>MathRequestMediaType</a:t>
+            </a:r>
+            <a:endParaRPr lang="en-US" dirty="0" smtClean="0"/>
+          </a:p>
+          <a:p>
+            <a:pPr lvl="1"/>
+            <a:r>
+              <a:rPr lang="en-US" dirty="0" smtClean="0"/>
+              <a:t>Implement </a:t>
+            </a:r>
+            <a:r>
+              <a:rPr lang="en-US" dirty="0" err="1" smtClean="0"/>
+              <a:t>IContentNegotiator</a:t>
+            </a:r>
+            <a:r>
+              <a:rPr lang="en-US" dirty="0" smtClean="0"/>
+              <a:t> </a:t>
+            </a:r>
+          </a:p>
+          <a:p>
+            <a:pPr marL="457046" lvl="1" indent="0">
+              <a:buNone/>
+            </a:pPr>
+            <a:endParaRPr lang="en-US" dirty="0"/>
+          </a:p>
+        </p:txBody>
+      </p:sp>
+      <p:sp>
+        <p:nvSpPr>
+          <p:cNvPr id="4" name="TextBox 3"/>
+          <p:cNvSpPr txBox="1"/>
+          <p:nvPr/>
+        </p:nvSpPr>
+        <p:spPr>
+          <a:xfrm>
+            <a:off x="9906000" y="-1"/>
+            <a:ext cx="2286000" cy="2031325"/>
+          </a:xfrm>
+          <a:prstGeom prst="rect">
+            <a:avLst/>
+          </a:prstGeom>
+          <a:solidFill>
+            <a:srgbClr val="FFFF00"/>
+          </a:solidFill>
+          <a:ln>
+            <a:noFill/>
+          </a:ln>
+        </p:spPr>
+        <p:txBody>
+          <a:bodyPr wrap="square" rtlCol="0">
+            <a:spAutoFit/>
+          </a:bodyPr>
+          <a:lstStyle/>
+          <a:p>
+            <a:pPr algn="ctr"/>
+            <a:endParaRPr lang="en-US" dirty="0" smtClean="0"/>
+          </a:p>
+          <a:p>
+            <a:pPr algn="ctr"/>
+            <a:endParaRPr lang="en-US" dirty="0"/>
+          </a:p>
+          <a:p>
+            <a:pPr algn="ctr"/>
+            <a:r>
+              <a:rPr lang="en-US" dirty="0" smtClean="0"/>
+              <a:t>Please leave this area blank to allow for picture in picture recording</a:t>
+            </a:r>
+          </a:p>
+          <a:p>
+            <a:pPr algn="ctr"/>
+            <a:endParaRPr lang="en-US" dirty="0"/>
+          </a:p>
+        </p:txBody>
+      </p:sp>
+    </p:spTree>
+    <p:extLst>
+      <p:ext uri="{BB962C8B-B14F-4D97-AF65-F5344CB8AC3E}">
+        <p14:creationId xmlns:p14="http://schemas.microsoft.com/office/powerpoint/2010/main" val="2544139816"/>
+      </p:ext>
+    </p:extLst>
+  </p:cSld>
+  <p:clrMapOvr>
+    <a:masterClrMapping/>
+  </p:clrMapOvr>
+  <p:timing>
+    <p:tnLst>
+      <p:par>
+        <p:cTn id="1" dur="indefinite" restart="never" nodeType="tmRoot"/>
+      </p:par>
+    </p:tnLst>
+  </p:timing>
+</p:sld>
+</file>
+
+<file path=ppt/slides/slide12.xml><?xml version="1.0" encoding="utf-8"?>
+<p:sld xmlns:a="http://schemas.openxmlformats.org/drawingml/2006/main" xmlns:r="http://schemas.openxmlformats.org/officeDocument/2006/relationships" xmlns:p="http://schemas.openxmlformats.org/presentationml/2006/main">
+  <p:cSld>
+    <p:spTree>
+      <p:nvGrpSpPr>
+        <p:cNvPr id="1" name=""/>
+        <p:cNvGrpSpPr/>
+        <p:nvPr/>
+      </p:nvGrpSpPr>
+      <p:grpSpPr>
+        <a:xfrm>
+          <a:off x="0" y="0"/>
+          <a:ext cx="0" cy="0"/>
+          <a:chOff x="0" y="0"/>
+          <a:chExt cx="0" cy="0"/>
+        </a:xfrm>
+      </p:grpSpPr>
+      <p:sp>
+        <p:nvSpPr>
+          <p:cNvPr id="2" name="Title 1"/>
+          <p:cNvSpPr>
+            <a:spLocks noGrp="1"/>
+          </p:cNvSpPr>
+          <p:nvPr>
+            <p:ph type="title"/>
+          </p:nvPr>
+        </p:nvSpPr>
+        <p:spPr/>
+        <p:txBody>
+          <a:bodyPr/>
+          <a:lstStyle/>
+          <a:p>
+            <a:r>
+              <a:rPr lang="en-US" b="1" dirty="0" smtClean="0"/>
               <a:t>Case Study: GitHub API</a:t>
             </a:r>
             <a:endParaRPr lang="en-US" dirty="0"/>
@@ -4074,7 +4473,7 @@
 </p:sld>
 </file>
 
-<file path=ppt/slides/slide11.xml><?xml version="1.0" encoding="utf-8"?>
+<file path=ppt/slides/slide13.xml><?xml version="1.0" encoding="utf-8"?>
 <p:sld xmlns:a="http://schemas.openxmlformats.org/drawingml/2006/main" xmlns:r="http://schemas.openxmlformats.org/officeDocument/2006/relationships" xmlns:p="http://schemas.openxmlformats.org/presentationml/2006/main">
   <p:cSld>
     <p:spTree>
@@ -4945,8 +5344,84 @@
           <a:p>
             <a:r>
               <a:rPr lang="en-US" dirty="0" smtClean="0"/>
-              <a:t>…</a:t>
-            </a:r>
+              <a:t>Route template</a:t>
+            </a:r>
+          </a:p>
+          <a:p>
+            <a:pPr lvl="1"/>
+            <a:r>
+              <a:rPr lang="en-US" dirty="0" err="1" smtClean="0"/>
+              <a:t>Api</a:t>
+            </a:r>
+            <a:r>
+              <a:rPr lang="en-US" dirty="0" smtClean="0"/>
+              <a:t>/{controller}/public/{resource}/{id}</a:t>
+            </a:r>
+          </a:p>
+          <a:p>
+            <a:pPr lvl="2"/>
+            <a:r>
+              <a:rPr lang="en-US" dirty="0" smtClean="0"/>
+              <a:t>controller = controller name</a:t>
+            </a:r>
+          </a:p>
+          <a:p>
+            <a:pPr lvl="2"/>
+            <a:r>
+              <a:rPr lang="en-US" dirty="0"/>
+              <a:t>a</a:t>
+            </a:r>
+            <a:r>
+              <a:rPr lang="en-US" dirty="0" smtClean="0"/>
+              <a:t>ction = action (usually omitted) </a:t>
+            </a:r>
+          </a:p>
+          <a:p>
+            <a:pPr lvl="1"/>
+            <a:r>
+              <a:rPr lang="en-US" dirty="0" smtClean="0"/>
+              <a:t>Provide default values</a:t>
+            </a:r>
+          </a:p>
+          <a:p>
+            <a:pPr lvl="2"/>
+            <a:r>
+              <a:rPr lang="en-US" dirty="0"/>
+              <a:t>d</a:t>
+            </a:r>
+            <a:r>
+              <a:rPr lang="en-US" dirty="0" smtClean="0"/>
+              <a:t>efaults: new { resource = “widgets” }</a:t>
+            </a:r>
+          </a:p>
+          <a:p>
+            <a:pPr lvl="1"/>
+            <a:r>
+              <a:rPr lang="en-US" dirty="0" smtClean="0"/>
+              <a:t>Constrain</a:t>
+            </a:r>
+          </a:p>
+          <a:p>
+            <a:pPr lvl="2"/>
+            <a:r>
+              <a:rPr lang="en-US" dirty="0" smtClean="0"/>
+              <a:t>constraints: new { id = @”\d+” }</a:t>
+            </a:r>
+          </a:p>
+          <a:p>
+            <a:pPr lvl="1"/>
+            <a:r>
+              <a:rPr lang="en-US" dirty="0" smtClean="0"/>
+              <a:t>Optional</a:t>
+            </a:r>
+          </a:p>
+          <a:p>
+            <a:pPr lvl="2"/>
+            <a:r>
+              <a:rPr lang="en-US" dirty="0" err="1" smtClean="0"/>
+              <a:t>RouteParameter.Optional</a:t>
+            </a:r>
+            <a:endParaRPr lang="en-US" dirty="0" smtClean="0"/>
           </a:p>
           <a:p>
             <a:endParaRPr lang="en-US" dirty="0" smtClean="0"/>
@@ -5007,31 +5482,9 @@
           <a:p>
             <a:r>
               <a:rPr lang="en-US" dirty="0" smtClean="0"/>
-              <a:t>Attribute Routing</a:t>
+              <a:t>Routes and Actions</a:t>
             </a:r>
             <a:endParaRPr lang="en-US" dirty="0"/>
-          </a:p>
-        </p:txBody>
-      </p:sp>
-      <p:sp>
-        <p:nvSpPr>
-          <p:cNvPr id="3" name="Content Placeholder 2"/>
-          <p:cNvSpPr>
-            <a:spLocks noGrp="1"/>
-          </p:cNvSpPr>
-          <p:nvPr>
-            <p:ph sz="quarter" idx="10"/>
-          </p:nvPr>
-        </p:nvSpPr>
-        <p:spPr/>
-        <p:txBody>
-          <a:bodyPr/>
-          <a:lstStyle/>
-          <a:p>
-            <a:r>
-              <a:rPr lang="en-US" dirty="0" smtClean="0"/>
-              <a:t>…</a:t>
-            </a:r>
           </a:p>
         </p:txBody>
       </p:sp>
@@ -5082,10 +5535,910 @@
           </a:p>
         </p:txBody>
       </p:sp>
+      <p:sp>
+        <p:nvSpPr>
+          <p:cNvPr id="5" name="Rectangle 4"/>
+          <p:cNvSpPr/>
+          <p:nvPr/>
+        </p:nvSpPr>
+        <p:spPr>
+          <a:xfrm>
+            <a:off x="379514" y="1148315"/>
+            <a:ext cx="1708298" cy="822251"/>
+          </a:xfrm>
+          <a:prstGeom prst="rect">
+            <a:avLst/>
+          </a:prstGeom>
+        </p:spPr>
+        <p:style>
+          <a:lnRef idx="2">
+            <a:schemeClr val="accent3">
+              <a:shade val="50000"/>
+            </a:schemeClr>
+          </a:lnRef>
+          <a:fillRef idx="1">
+            <a:schemeClr val="accent3"/>
+          </a:fillRef>
+          <a:effectRef idx="0">
+            <a:schemeClr val="accent3"/>
+          </a:effectRef>
+          <a:fontRef idx="minor">
+            <a:schemeClr val="lt1"/>
+          </a:fontRef>
+        </p:style>
+        <p:txBody>
+          <a:bodyPr rtlCol="0" anchor="ctr"/>
+          <a:lstStyle/>
+          <a:p>
+            <a:pPr algn="ctr"/>
+            <a:r>
+              <a:rPr lang="en-US" dirty="0" smtClean="0"/>
+              <a:t>Select Controller</a:t>
+            </a:r>
+            <a:endParaRPr lang="en-US" dirty="0"/>
+          </a:p>
+        </p:txBody>
+      </p:sp>
+      <p:sp>
+        <p:nvSpPr>
+          <p:cNvPr id="11" name="Rectangle 10"/>
+          <p:cNvSpPr/>
+          <p:nvPr/>
+        </p:nvSpPr>
+        <p:spPr>
+          <a:xfrm>
+            <a:off x="2580310" y="1148314"/>
+            <a:ext cx="1708298" cy="822251"/>
+          </a:xfrm>
+          <a:prstGeom prst="rect">
+            <a:avLst/>
+          </a:prstGeom>
+        </p:spPr>
+        <p:style>
+          <a:lnRef idx="3">
+            <a:schemeClr val="lt1"/>
+          </a:lnRef>
+          <a:fillRef idx="1">
+            <a:schemeClr val="accent3"/>
+          </a:fillRef>
+          <a:effectRef idx="1">
+            <a:schemeClr val="accent3"/>
+          </a:effectRef>
+          <a:fontRef idx="minor">
+            <a:schemeClr val="lt1"/>
+          </a:fontRef>
+        </p:style>
+        <p:txBody>
+          <a:bodyPr rtlCol="0" anchor="ctr"/>
+          <a:lstStyle/>
+          <a:p>
+            <a:pPr algn="ctr"/>
+            <a:r>
+              <a:rPr lang="en-US" dirty="0" smtClean="0"/>
+              <a:t>Route Dictionary</a:t>
+            </a:r>
+            <a:endParaRPr lang="en-US" dirty="0"/>
+          </a:p>
+        </p:txBody>
+      </p:sp>
+      <p:sp>
+        <p:nvSpPr>
+          <p:cNvPr id="14" name="Rectangle 13"/>
+          <p:cNvSpPr/>
+          <p:nvPr/>
+        </p:nvSpPr>
+        <p:spPr>
+          <a:xfrm>
+            <a:off x="4781106" y="1148314"/>
+            <a:ext cx="1708298" cy="822251"/>
+          </a:xfrm>
+          <a:prstGeom prst="rect">
+            <a:avLst/>
+          </a:prstGeom>
+        </p:spPr>
+        <p:style>
+          <a:lnRef idx="3">
+            <a:schemeClr val="lt1"/>
+          </a:lnRef>
+          <a:fillRef idx="1">
+            <a:schemeClr val="accent3"/>
+          </a:fillRef>
+          <a:effectRef idx="1">
+            <a:schemeClr val="accent3"/>
+          </a:effectRef>
+          <a:fontRef idx="minor">
+            <a:schemeClr val="lt1"/>
+          </a:fontRef>
+        </p:style>
+        <p:txBody>
+          <a:bodyPr rtlCol="0" anchor="ctr"/>
+          <a:lstStyle/>
+          <a:p>
+            <a:pPr algn="ctr"/>
+            <a:r>
+              <a:rPr lang="en-US" dirty="0" smtClean="0"/>
+              <a:t>{controller}+ Controller</a:t>
+            </a:r>
+            <a:endParaRPr lang="en-US" dirty="0"/>
+          </a:p>
+        </p:txBody>
+      </p:sp>
+      <p:sp>
+        <p:nvSpPr>
+          <p:cNvPr id="15" name="Rectangle 14"/>
+          <p:cNvSpPr/>
+          <p:nvPr/>
+        </p:nvSpPr>
+        <p:spPr>
+          <a:xfrm>
+            <a:off x="6981902" y="1148313"/>
+            <a:ext cx="1708298" cy="822251"/>
+          </a:xfrm>
+          <a:prstGeom prst="rect">
+            <a:avLst/>
+          </a:prstGeom>
+        </p:spPr>
+        <p:style>
+          <a:lnRef idx="3">
+            <a:schemeClr val="lt1"/>
+          </a:lnRef>
+          <a:fillRef idx="1">
+            <a:schemeClr val="accent3"/>
+          </a:fillRef>
+          <a:effectRef idx="1">
+            <a:schemeClr val="accent3"/>
+          </a:effectRef>
+          <a:fontRef idx="minor">
+            <a:schemeClr val="lt1"/>
+          </a:fontRef>
+        </p:style>
+        <p:txBody>
+          <a:bodyPr rtlCol="0" anchor="ctr"/>
+          <a:lstStyle/>
+          <a:p>
+            <a:pPr algn="ctr"/>
+            <a:r>
+              <a:rPr lang="en-US" dirty="0" smtClean="0"/>
+              <a:t>{controller} [type]</a:t>
+            </a:r>
+            <a:endParaRPr lang="en-US" dirty="0"/>
+          </a:p>
+        </p:txBody>
+      </p:sp>
+      <p:cxnSp>
+        <p:nvCxnSpPr>
+          <p:cNvPr id="16" name="Straight Arrow Connector 15"/>
+          <p:cNvCxnSpPr>
+            <a:stCxn id="5" idx="3"/>
+            <a:endCxn id="11" idx="1"/>
+          </p:cNvCxnSpPr>
+          <p:nvPr/>
+        </p:nvCxnSpPr>
+        <p:spPr>
+          <a:xfrm flipV="1">
+            <a:off x="2087812" y="1559440"/>
+            <a:ext cx="492498" cy="1"/>
+          </a:xfrm>
+          <a:prstGeom prst="straightConnector1">
+            <a:avLst/>
+          </a:prstGeom>
+          <a:ln>
+            <a:tailEnd type="triangle"/>
+          </a:ln>
+        </p:spPr>
+        <p:style>
+          <a:lnRef idx="3">
+            <a:schemeClr val="accent6"/>
+          </a:lnRef>
+          <a:fillRef idx="0">
+            <a:schemeClr val="accent6"/>
+          </a:fillRef>
+          <a:effectRef idx="2">
+            <a:schemeClr val="accent6"/>
+          </a:effectRef>
+          <a:fontRef idx="minor">
+            <a:schemeClr val="tx1"/>
+          </a:fontRef>
+        </p:style>
+      </p:cxnSp>
+      <p:cxnSp>
+        <p:nvCxnSpPr>
+          <p:cNvPr id="19" name="Straight Arrow Connector 18"/>
+          <p:cNvCxnSpPr>
+            <a:stCxn id="11" idx="3"/>
+            <a:endCxn id="14" idx="1"/>
+          </p:cNvCxnSpPr>
+          <p:nvPr/>
+        </p:nvCxnSpPr>
+        <p:spPr>
+          <a:xfrm>
+            <a:off x="4288608" y="1559440"/>
+            <a:ext cx="492498" cy="0"/>
+          </a:xfrm>
+          <a:prstGeom prst="straightConnector1">
+            <a:avLst/>
+          </a:prstGeom>
+          <a:ln>
+            <a:tailEnd type="triangle"/>
+          </a:ln>
+        </p:spPr>
+        <p:style>
+          <a:lnRef idx="3">
+            <a:schemeClr val="accent6"/>
+          </a:lnRef>
+          <a:fillRef idx="0">
+            <a:schemeClr val="accent6"/>
+          </a:fillRef>
+          <a:effectRef idx="2">
+            <a:schemeClr val="accent6"/>
+          </a:effectRef>
+          <a:fontRef idx="minor">
+            <a:schemeClr val="tx1"/>
+          </a:fontRef>
+        </p:style>
+      </p:cxnSp>
+      <p:cxnSp>
+        <p:nvCxnSpPr>
+          <p:cNvPr id="21" name="Straight Arrow Connector 20"/>
+          <p:cNvCxnSpPr>
+            <a:stCxn id="14" idx="3"/>
+            <a:endCxn id="15" idx="1"/>
+          </p:cNvCxnSpPr>
+          <p:nvPr/>
+        </p:nvCxnSpPr>
+        <p:spPr>
+          <a:xfrm flipV="1">
+            <a:off x="6489404" y="1559439"/>
+            <a:ext cx="492498" cy="1"/>
+          </a:xfrm>
+          <a:prstGeom prst="straightConnector1">
+            <a:avLst/>
+          </a:prstGeom>
+          <a:ln>
+            <a:tailEnd type="triangle"/>
+          </a:ln>
+        </p:spPr>
+        <p:style>
+          <a:lnRef idx="3">
+            <a:schemeClr val="accent6"/>
+          </a:lnRef>
+          <a:fillRef idx="0">
+            <a:schemeClr val="accent6"/>
+          </a:fillRef>
+          <a:effectRef idx="2">
+            <a:schemeClr val="accent6"/>
+          </a:effectRef>
+          <a:fontRef idx="minor">
+            <a:schemeClr val="tx1"/>
+          </a:fontRef>
+        </p:style>
+      </p:cxnSp>
+      <p:sp>
+        <p:nvSpPr>
+          <p:cNvPr id="23" name="Rectangle 22"/>
+          <p:cNvSpPr/>
+          <p:nvPr/>
+        </p:nvSpPr>
+        <p:spPr>
+          <a:xfrm>
+            <a:off x="383057" y="2936666"/>
+            <a:ext cx="1708298" cy="822251"/>
+          </a:xfrm>
+          <a:prstGeom prst="rect">
+            <a:avLst/>
+          </a:prstGeom>
+        </p:spPr>
+        <p:style>
+          <a:lnRef idx="2">
+            <a:schemeClr val="accent4">
+              <a:shade val="50000"/>
+            </a:schemeClr>
+          </a:lnRef>
+          <a:fillRef idx="1">
+            <a:schemeClr val="accent4"/>
+          </a:fillRef>
+          <a:effectRef idx="0">
+            <a:schemeClr val="accent4"/>
+          </a:effectRef>
+          <a:fontRef idx="minor">
+            <a:schemeClr val="lt1"/>
+          </a:fontRef>
+        </p:style>
+        <p:txBody>
+          <a:bodyPr rtlCol="0" anchor="ctr"/>
+          <a:lstStyle/>
+          <a:p>
+            <a:pPr algn="ctr"/>
+            <a:r>
+              <a:rPr lang="en-US" dirty="0" smtClean="0"/>
+              <a:t>Select Action</a:t>
+            </a:r>
+            <a:endParaRPr lang="en-US" dirty="0"/>
+          </a:p>
+        </p:txBody>
+      </p:sp>
+      <p:sp>
+        <p:nvSpPr>
+          <p:cNvPr id="24" name="Rectangle 23"/>
+          <p:cNvSpPr/>
+          <p:nvPr/>
+        </p:nvSpPr>
+        <p:spPr>
+          <a:xfrm>
+            <a:off x="2580310" y="2936664"/>
+            <a:ext cx="1708298" cy="822251"/>
+          </a:xfrm>
+          <a:prstGeom prst="rect">
+            <a:avLst/>
+          </a:prstGeom>
+        </p:spPr>
+        <p:style>
+          <a:lnRef idx="3">
+            <a:schemeClr val="lt1"/>
+          </a:lnRef>
+          <a:fillRef idx="1">
+            <a:schemeClr val="accent4"/>
+          </a:fillRef>
+          <a:effectRef idx="1">
+            <a:schemeClr val="accent4"/>
+          </a:effectRef>
+          <a:fontRef idx="minor">
+            <a:schemeClr val="lt1"/>
+          </a:fontRef>
+        </p:style>
+        <p:txBody>
+          <a:bodyPr rtlCol="0" anchor="ctr"/>
+          <a:lstStyle/>
+          <a:p>
+            <a:pPr algn="ctr"/>
+            <a:r>
+              <a:rPr lang="en-US" dirty="0" smtClean="0"/>
+              <a:t>HTTP Method</a:t>
+            </a:r>
+            <a:endParaRPr lang="en-US" dirty="0"/>
+          </a:p>
+        </p:txBody>
+      </p:sp>
+      <p:sp>
+        <p:nvSpPr>
+          <p:cNvPr id="25" name="Rectangle 24"/>
+          <p:cNvSpPr/>
+          <p:nvPr/>
+        </p:nvSpPr>
+        <p:spPr>
+          <a:xfrm>
+            <a:off x="4781106" y="2936663"/>
+            <a:ext cx="1708298" cy="822251"/>
+          </a:xfrm>
+          <a:prstGeom prst="rect">
+            <a:avLst/>
+          </a:prstGeom>
+        </p:spPr>
+        <p:style>
+          <a:lnRef idx="3">
+            <a:schemeClr val="lt1"/>
+          </a:lnRef>
+          <a:fillRef idx="1">
+            <a:schemeClr val="accent4"/>
+          </a:fillRef>
+          <a:effectRef idx="1">
+            <a:schemeClr val="accent4"/>
+          </a:effectRef>
+          <a:fontRef idx="minor">
+            <a:schemeClr val="lt1"/>
+          </a:fontRef>
+        </p:style>
+        <p:txBody>
+          <a:bodyPr rtlCol="0" anchor="ctr"/>
+          <a:lstStyle/>
+          <a:p>
+            <a:pPr algn="ctr"/>
+            <a:r>
+              <a:rPr lang="en-US" dirty="0" smtClean="0"/>
+              <a:t>{action}</a:t>
+            </a:r>
+            <a:endParaRPr lang="en-US" dirty="0"/>
+          </a:p>
+        </p:txBody>
+      </p:sp>
+      <p:sp>
+        <p:nvSpPr>
+          <p:cNvPr id="26" name="Rectangle 25"/>
+          <p:cNvSpPr/>
+          <p:nvPr/>
+        </p:nvSpPr>
+        <p:spPr>
+          <a:xfrm>
+            <a:off x="6976802" y="2936662"/>
+            <a:ext cx="1708298" cy="822251"/>
+          </a:xfrm>
+          <a:prstGeom prst="rect">
+            <a:avLst/>
+          </a:prstGeom>
+        </p:spPr>
+        <p:style>
+          <a:lnRef idx="3">
+            <a:schemeClr val="lt1"/>
+          </a:lnRef>
+          <a:fillRef idx="1">
+            <a:schemeClr val="accent4"/>
+          </a:fillRef>
+          <a:effectRef idx="1">
+            <a:schemeClr val="accent4"/>
+          </a:effectRef>
+          <a:fontRef idx="minor">
+            <a:schemeClr val="lt1"/>
+          </a:fontRef>
+        </p:style>
+        <p:txBody>
+          <a:bodyPr rtlCol="0" anchor="ctr"/>
+          <a:lstStyle/>
+          <a:p>
+            <a:pPr algn="ctr"/>
+            <a:r>
+              <a:rPr lang="en-US" dirty="0" smtClean="0"/>
+              <a:t>(</a:t>
+            </a:r>
+            <a:r>
+              <a:rPr lang="en-US" dirty="0" err="1" smtClean="0"/>
+              <a:t>params</a:t>
+            </a:r>
+            <a:r>
+              <a:rPr lang="en-US" dirty="0" smtClean="0"/>
+              <a:t>)</a:t>
+            </a:r>
+            <a:endParaRPr lang="en-US" dirty="0"/>
+          </a:p>
+        </p:txBody>
+      </p:sp>
+      <p:cxnSp>
+        <p:nvCxnSpPr>
+          <p:cNvPr id="28" name="Curved Connector 27"/>
+          <p:cNvCxnSpPr>
+            <a:stCxn id="14" idx="2"/>
+            <a:endCxn id="23" idx="0"/>
+          </p:cNvCxnSpPr>
+          <p:nvPr/>
+        </p:nvCxnSpPr>
+        <p:spPr>
+          <a:xfrm rot="5400000">
+            <a:off x="2953181" y="254591"/>
+            <a:ext cx="966101" cy="4398049"/>
+          </a:xfrm>
+          <a:prstGeom prst="curvedConnector3">
+            <a:avLst/>
+          </a:prstGeom>
+          <a:ln>
+            <a:tailEnd type="triangle"/>
+          </a:ln>
+        </p:spPr>
+        <p:style>
+          <a:lnRef idx="3">
+            <a:schemeClr val="accent6"/>
+          </a:lnRef>
+          <a:fillRef idx="0">
+            <a:schemeClr val="accent6"/>
+          </a:fillRef>
+          <a:effectRef idx="2">
+            <a:schemeClr val="accent6"/>
+          </a:effectRef>
+          <a:fontRef idx="minor">
+            <a:schemeClr val="tx1"/>
+          </a:fontRef>
+        </p:style>
+      </p:cxnSp>
+      <p:cxnSp>
+        <p:nvCxnSpPr>
+          <p:cNvPr id="30" name="Curved Connector 29"/>
+          <p:cNvCxnSpPr>
+            <a:stCxn id="15" idx="2"/>
+            <a:endCxn id="23" idx="0"/>
+          </p:cNvCxnSpPr>
+          <p:nvPr/>
+        </p:nvCxnSpPr>
+        <p:spPr>
+          <a:xfrm rot="5400000">
+            <a:off x="4053578" y="-845807"/>
+            <a:ext cx="966102" cy="6598845"/>
+          </a:xfrm>
+          <a:prstGeom prst="curvedConnector3">
+            <a:avLst>
+              <a:gd name="adj1" fmla="val 50000"/>
+            </a:avLst>
+          </a:prstGeom>
+          <a:ln>
+            <a:tailEnd type="triangle"/>
+          </a:ln>
+        </p:spPr>
+        <p:style>
+          <a:lnRef idx="3">
+            <a:schemeClr val="accent6"/>
+          </a:lnRef>
+          <a:fillRef idx="0">
+            <a:schemeClr val="accent6"/>
+          </a:fillRef>
+          <a:effectRef idx="2">
+            <a:schemeClr val="accent6"/>
+          </a:effectRef>
+          <a:fontRef idx="minor">
+            <a:schemeClr val="tx1"/>
+          </a:fontRef>
+        </p:style>
+      </p:cxnSp>
+      <p:sp>
+        <p:nvSpPr>
+          <p:cNvPr id="32" name="&quot;No&quot; Symbol 31"/>
+          <p:cNvSpPr/>
+          <p:nvPr/>
+        </p:nvSpPr>
+        <p:spPr>
+          <a:xfrm>
+            <a:off x="9264502" y="4437321"/>
+            <a:ext cx="1368056" cy="1282995"/>
+          </a:xfrm>
+          <a:prstGeom prst="noSmoking">
+            <a:avLst/>
+          </a:prstGeom>
+        </p:spPr>
+        <p:style>
+          <a:lnRef idx="2">
+            <a:schemeClr val="accent2">
+              <a:shade val="50000"/>
+            </a:schemeClr>
+          </a:lnRef>
+          <a:fillRef idx="1">
+            <a:schemeClr val="accent2"/>
+          </a:fillRef>
+          <a:effectRef idx="0">
+            <a:schemeClr val="accent2"/>
+          </a:effectRef>
+          <a:fontRef idx="minor">
+            <a:schemeClr val="lt1"/>
+          </a:fontRef>
+        </p:style>
+        <p:txBody>
+          <a:bodyPr rtlCol="0" anchor="ctr"/>
+          <a:lstStyle/>
+          <a:p>
+            <a:pPr algn="ctr"/>
+            <a:endParaRPr lang="en-US" dirty="0">
+              <a:solidFill>
+                <a:schemeClr val="tx1"/>
+              </a:solidFill>
+            </a:endParaRPr>
+          </a:p>
+        </p:txBody>
+      </p:sp>
+      <p:cxnSp>
+        <p:nvCxnSpPr>
+          <p:cNvPr id="34" name="Curved Connector 33"/>
+          <p:cNvCxnSpPr>
+            <a:stCxn id="15" idx="3"/>
+            <a:endCxn id="32" idx="0"/>
+          </p:cNvCxnSpPr>
+          <p:nvPr/>
+        </p:nvCxnSpPr>
+        <p:spPr>
+          <a:xfrm>
+            <a:off x="8690200" y="1559439"/>
+            <a:ext cx="1258330" cy="2877882"/>
+          </a:xfrm>
+          <a:prstGeom prst="curvedConnector2">
+            <a:avLst/>
+          </a:prstGeom>
+          <a:ln>
+            <a:tailEnd type="triangle"/>
+          </a:ln>
+        </p:spPr>
+        <p:style>
+          <a:lnRef idx="3">
+            <a:schemeClr val="accent6"/>
+          </a:lnRef>
+          <a:fillRef idx="0">
+            <a:schemeClr val="accent6"/>
+          </a:fillRef>
+          <a:effectRef idx="2">
+            <a:schemeClr val="accent6"/>
+          </a:effectRef>
+          <a:fontRef idx="minor">
+            <a:schemeClr val="tx1"/>
+          </a:fontRef>
+        </p:style>
+      </p:cxnSp>
+      <p:cxnSp>
+        <p:nvCxnSpPr>
+          <p:cNvPr id="35" name="Straight Arrow Connector 34"/>
+          <p:cNvCxnSpPr>
+            <a:stCxn id="23" idx="3"/>
+            <a:endCxn id="24" idx="1"/>
+          </p:cNvCxnSpPr>
+          <p:nvPr/>
+        </p:nvCxnSpPr>
+        <p:spPr>
+          <a:xfrm flipV="1">
+            <a:off x="2091355" y="3347790"/>
+            <a:ext cx="488955" cy="2"/>
+          </a:xfrm>
+          <a:prstGeom prst="straightConnector1">
+            <a:avLst/>
+          </a:prstGeom>
+          <a:ln>
+            <a:tailEnd type="triangle"/>
+          </a:ln>
+        </p:spPr>
+        <p:style>
+          <a:lnRef idx="3">
+            <a:schemeClr val="accent6"/>
+          </a:lnRef>
+          <a:fillRef idx="0">
+            <a:schemeClr val="accent6"/>
+          </a:fillRef>
+          <a:effectRef idx="2">
+            <a:schemeClr val="accent6"/>
+          </a:effectRef>
+          <a:fontRef idx="minor">
+            <a:schemeClr val="tx1"/>
+          </a:fontRef>
+        </p:style>
+      </p:cxnSp>
+      <p:cxnSp>
+        <p:nvCxnSpPr>
+          <p:cNvPr id="39" name="Straight Arrow Connector 38"/>
+          <p:cNvCxnSpPr/>
+          <p:nvPr/>
+        </p:nvCxnSpPr>
+        <p:spPr>
+          <a:xfrm flipV="1">
+            <a:off x="4287339" y="3347786"/>
+            <a:ext cx="492498" cy="1"/>
+          </a:xfrm>
+          <a:prstGeom prst="straightConnector1">
+            <a:avLst/>
+          </a:prstGeom>
+          <a:ln>
+            <a:tailEnd type="triangle"/>
+          </a:ln>
+        </p:spPr>
+        <p:style>
+          <a:lnRef idx="3">
+            <a:schemeClr val="accent6"/>
+          </a:lnRef>
+          <a:fillRef idx="0">
+            <a:schemeClr val="accent6"/>
+          </a:fillRef>
+          <a:effectRef idx="2">
+            <a:schemeClr val="accent6"/>
+          </a:effectRef>
+          <a:fontRef idx="minor">
+            <a:schemeClr val="tx1"/>
+          </a:fontRef>
+        </p:style>
+      </p:cxnSp>
+      <p:cxnSp>
+        <p:nvCxnSpPr>
+          <p:cNvPr id="40" name="Straight Arrow Connector 39"/>
+          <p:cNvCxnSpPr/>
+          <p:nvPr/>
+        </p:nvCxnSpPr>
+        <p:spPr>
+          <a:xfrm flipV="1">
+            <a:off x="6485861" y="3347785"/>
+            <a:ext cx="492498" cy="1"/>
+          </a:xfrm>
+          <a:prstGeom prst="straightConnector1">
+            <a:avLst/>
+          </a:prstGeom>
+          <a:ln>
+            <a:tailEnd type="triangle"/>
+          </a:ln>
+        </p:spPr>
+        <p:style>
+          <a:lnRef idx="3">
+            <a:schemeClr val="accent6"/>
+          </a:lnRef>
+          <a:fillRef idx="0">
+            <a:schemeClr val="accent6"/>
+          </a:fillRef>
+          <a:effectRef idx="2">
+            <a:schemeClr val="accent6"/>
+          </a:effectRef>
+          <a:fontRef idx="minor">
+            <a:schemeClr val="tx1"/>
+          </a:fontRef>
+        </p:style>
+      </p:cxnSp>
+      <p:cxnSp>
+        <p:nvCxnSpPr>
+          <p:cNvPr id="41" name="Curved Connector 40"/>
+          <p:cNvCxnSpPr>
+            <a:stCxn id="26" idx="3"/>
+            <a:endCxn id="32" idx="0"/>
+          </p:cNvCxnSpPr>
+          <p:nvPr/>
+        </p:nvCxnSpPr>
+        <p:spPr>
+          <a:xfrm>
+            <a:off x="8685100" y="3347788"/>
+            <a:ext cx="1263430" cy="1089533"/>
+          </a:xfrm>
+          <a:prstGeom prst="curvedConnector2">
+            <a:avLst/>
+          </a:prstGeom>
+          <a:ln>
+            <a:tailEnd type="triangle"/>
+          </a:ln>
+        </p:spPr>
+        <p:style>
+          <a:lnRef idx="3">
+            <a:schemeClr val="accent6"/>
+          </a:lnRef>
+          <a:fillRef idx="0">
+            <a:schemeClr val="accent6"/>
+          </a:fillRef>
+          <a:effectRef idx="2">
+            <a:schemeClr val="accent6"/>
+          </a:effectRef>
+          <a:fontRef idx="minor">
+            <a:schemeClr val="tx1"/>
+          </a:fontRef>
+        </p:style>
+      </p:cxnSp>
+      <p:sp>
+        <p:nvSpPr>
+          <p:cNvPr id="44" name="Rectangle 43"/>
+          <p:cNvSpPr/>
+          <p:nvPr/>
+        </p:nvSpPr>
+        <p:spPr>
+          <a:xfrm>
+            <a:off x="4777563" y="4725012"/>
+            <a:ext cx="1708298" cy="822251"/>
+          </a:xfrm>
+          <a:prstGeom prst="rect">
+            <a:avLst/>
+          </a:prstGeom>
+        </p:spPr>
+        <p:style>
+          <a:lnRef idx="2">
+            <a:schemeClr val="accent3">
+              <a:shade val="50000"/>
+            </a:schemeClr>
+          </a:lnRef>
+          <a:fillRef idx="1">
+            <a:schemeClr val="accent3"/>
+          </a:fillRef>
+          <a:effectRef idx="0">
+            <a:schemeClr val="accent3"/>
+          </a:effectRef>
+          <a:fontRef idx="minor">
+            <a:schemeClr val="lt1"/>
+          </a:fontRef>
+        </p:style>
+        <p:txBody>
+          <a:bodyPr rtlCol="0" anchor="ctr"/>
+          <a:lstStyle/>
+          <a:p>
+            <a:pPr algn="ctr"/>
+            <a:r>
+              <a:rPr lang="en-US" dirty="0" smtClean="0"/>
+              <a:t>Controller .Method()</a:t>
+            </a:r>
+            <a:endParaRPr lang="en-US" dirty="0"/>
+          </a:p>
+        </p:txBody>
+      </p:sp>
+      <p:cxnSp>
+        <p:nvCxnSpPr>
+          <p:cNvPr id="46" name="Curved Connector 45"/>
+          <p:cNvCxnSpPr>
+            <a:stCxn id="26" idx="2"/>
+            <a:endCxn id="44" idx="3"/>
+          </p:cNvCxnSpPr>
+          <p:nvPr/>
+        </p:nvCxnSpPr>
+        <p:spPr>
+          <a:xfrm rot="5400000">
+            <a:off x="6469794" y="3774980"/>
+            <a:ext cx="1377225" cy="1345090"/>
+          </a:xfrm>
+          <a:prstGeom prst="curvedConnector2">
+            <a:avLst/>
+          </a:prstGeom>
+          <a:ln>
+            <a:tailEnd type="triangle"/>
+          </a:ln>
+        </p:spPr>
+        <p:style>
+          <a:lnRef idx="3">
+            <a:schemeClr val="accent6"/>
+          </a:lnRef>
+          <a:fillRef idx="0">
+            <a:schemeClr val="accent6"/>
+          </a:fillRef>
+          <a:effectRef idx="2">
+            <a:schemeClr val="accent6"/>
+          </a:effectRef>
+          <a:fontRef idx="minor">
+            <a:schemeClr val="tx1"/>
+          </a:fontRef>
+        </p:style>
+      </p:cxnSp>
+      <p:cxnSp>
+        <p:nvCxnSpPr>
+          <p:cNvPr id="48" name="Curved Connector 47"/>
+          <p:cNvCxnSpPr>
+            <a:stCxn id="25" idx="2"/>
+            <a:endCxn id="44" idx="0"/>
+          </p:cNvCxnSpPr>
+          <p:nvPr/>
+        </p:nvCxnSpPr>
+        <p:spPr>
+          <a:xfrm rot="5400000">
+            <a:off x="5150435" y="4240192"/>
+            <a:ext cx="966098" cy="3543"/>
+          </a:xfrm>
+          <a:prstGeom prst="curvedConnector3">
+            <a:avLst/>
+          </a:prstGeom>
+          <a:ln>
+            <a:tailEnd type="triangle"/>
+          </a:ln>
+        </p:spPr>
+        <p:style>
+          <a:lnRef idx="3">
+            <a:schemeClr val="accent6"/>
+          </a:lnRef>
+          <a:fillRef idx="0">
+            <a:schemeClr val="accent6"/>
+          </a:fillRef>
+          <a:effectRef idx="2">
+            <a:schemeClr val="accent6"/>
+          </a:effectRef>
+          <a:fontRef idx="minor">
+            <a:schemeClr val="tx1"/>
+          </a:fontRef>
+        </p:style>
+      </p:cxnSp>
+      <p:cxnSp>
+        <p:nvCxnSpPr>
+          <p:cNvPr id="50" name="Curved Connector 49"/>
+          <p:cNvCxnSpPr>
+            <a:stCxn id="24" idx="2"/>
+            <a:endCxn id="44" idx="1"/>
+          </p:cNvCxnSpPr>
+          <p:nvPr/>
+        </p:nvCxnSpPr>
+        <p:spPr>
+          <a:xfrm rot="16200000" flipH="1">
+            <a:off x="3417400" y="3775974"/>
+            <a:ext cx="1377223" cy="1343104"/>
+          </a:xfrm>
+          <a:prstGeom prst="curvedConnector2">
+            <a:avLst/>
+          </a:prstGeom>
+          <a:ln>
+            <a:tailEnd type="triangle"/>
+          </a:ln>
+        </p:spPr>
+        <p:style>
+          <a:lnRef idx="3">
+            <a:schemeClr val="accent6"/>
+          </a:lnRef>
+          <a:fillRef idx="0">
+            <a:schemeClr val="accent6"/>
+          </a:fillRef>
+          <a:effectRef idx="2">
+            <a:schemeClr val="accent6"/>
+          </a:effectRef>
+          <a:fontRef idx="minor">
+            <a:schemeClr val="tx1"/>
+          </a:fontRef>
+        </p:style>
+      </p:cxnSp>
     </p:spTree>
     <p:extLst>
       <p:ext uri="{BB962C8B-B14F-4D97-AF65-F5344CB8AC3E}">
-        <p14:creationId xmlns:p14="http://schemas.microsoft.com/office/powerpoint/2010/main" val="2047590724"/>
+        <p14:creationId xmlns:p14="http://schemas.microsoft.com/office/powerpoint/2010/main" val="2808865760"/>
       </p:ext>
     </p:extLst>
   </p:cSld>
@@ -5136,7 +6489,7 @@
           <a:p>
             <a:r>
               <a:rPr lang="en-US" dirty="0" smtClean="0"/>
-              <a:t>Custom Content Negotiation</a:t>
+              <a:t>Attribute Routing</a:t>
             </a:r>
             <a:endParaRPr lang="en-US" dirty="0"/>
           </a:p>
@@ -5159,8 +6512,99 @@
           <a:p>
             <a:r>
               <a:rPr lang="en-US" dirty="0" smtClean="0"/>
-              <a:t>…</a:t>
-            </a:r>
+              <a:t>Child resources</a:t>
+            </a:r>
+          </a:p>
+          <a:p>
+            <a:r>
+              <a:rPr lang="en-US" dirty="0" smtClean="0"/>
+              <a:t>Add the attribute to the controller action</a:t>
+            </a:r>
+          </a:p>
+          <a:p>
+            <a:r>
+              <a:rPr lang="en-US" dirty="0" smtClean="0"/>
+              <a:t>Must enable in configuration:</a:t>
+            </a:r>
+          </a:p>
+          <a:p>
+            <a:pPr lvl="1"/>
+            <a:r>
+              <a:rPr lang="en-US" dirty="0" err="1" smtClean="0"/>
+              <a:t>config.MapHttpAttributeRoutes</a:t>
+            </a:r>
+            <a:r>
+              <a:rPr lang="en-US" dirty="0" smtClean="0"/>
+              <a:t>();</a:t>
+            </a:r>
+          </a:p>
+          <a:p>
+            <a:r>
+              <a:rPr lang="en-US" dirty="0" smtClean="0"/>
+              <a:t>Use </a:t>
+            </a:r>
+            <a:r>
+              <a:rPr lang="en-US" dirty="0" err="1" smtClean="0"/>
+              <a:t>RoutePrefix</a:t>
+            </a:r>
+            <a:r>
+              <a:rPr lang="en-US" dirty="0" smtClean="0"/>
+              <a:t> for a common prefix on the controller</a:t>
+            </a:r>
+          </a:p>
+          <a:p>
+            <a:pPr lvl="1"/>
+            <a:r>
+              <a:rPr lang="en-US" dirty="0" smtClean="0"/>
+              <a:t>tilde to override (i.e. “~/</a:t>
+            </a:r>
+            <a:r>
+              <a:rPr lang="en-US" dirty="0" err="1" smtClean="0"/>
+              <a:t>api</a:t>
+            </a:r>
+            <a:r>
+              <a:rPr lang="en-US" dirty="0" smtClean="0"/>
+              <a:t>/</a:t>
+            </a:r>
+            <a:r>
+              <a:rPr lang="en-US" dirty="0" err="1" smtClean="0"/>
+              <a:t>overrideprefix</a:t>
+            </a:r>
+            <a:r>
+              <a:rPr lang="en-US" dirty="0" smtClean="0"/>
+              <a:t>”)</a:t>
+            </a:r>
+          </a:p>
+          <a:p>
+            <a:pPr lvl="1"/>
+            <a:r>
+              <a:rPr lang="en-US" dirty="0" smtClean="0"/>
+              <a:t>May include parameters</a:t>
+            </a:r>
+          </a:p>
+          <a:p>
+            <a:pPr lvl="1"/>
+            <a:r>
+              <a:rPr lang="en-US" dirty="0" smtClean="0"/>
+              <a:t>Pass constraints (</a:t>
+            </a:r>
+            <a:r>
+              <a:rPr lang="en-US" dirty="0" err="1" smtClean="0"/>
+              <a:t>int</a:t>
+            </a:r>
+            <a:r>
+              <a:rPr lang="en-US" dirty="0" smtClean="0"/>
+              <a:t>, alpha, </a:t>
+            </a:r>
+            <a:r>
+              <a:rPr lang="en-US" dirty="0" err="1" smtClean="0"/>
+              <a:t>bool</a:t>
+            </a:r>
+            <a:r>
+              <a:rPr lang="en-US" dirty="0" smtClean="0"/>
+              <a:t>, etc.)</a:t>
+            </a:r>
+            <a:endParaRPr lang="en-US" dirty="0" smtClean="0"/>
           </a:p>
         </p:txBody>
       </p:sp>
@@ -5214,7 +6658,7 @@
     </p:spTree>
     <p:extLst>
       <p:ext uri="{BB962C8B-B14F-4D97-AF65-F5344CB8AC3E}">
-        <p14:creationId xmlns:p14="http://schemas.microsoft.com/office/powerpoint/2010/main" val="2544139816"/>
+        <p14:creationId xmlns:p14="http://schemas.microsoft.com/office/powerpoint/2010/main" val="2047590724"/>
       </p:ext>
     </p:extLst>
   </p:cSld>
@@ -6039,28 +7483,6 @@
 </file>
 
 <file path=customXml/item1.xml><?xml version="1.0" encoding="utf-8"?>
-<p:properties xmlns:p="http://schemas.microsoft.com/office/2006/metadata/properties" xmlns:xsi="http://www.w3.org/2001/XMLSchema-instance" xmlns:pc="http://schemas.microsoft.com/office/infopath/2007/PartnerControls">
-  <documentManagement>
-    <TaxCatchAll xmlns="230e9df3-be65-4c73-a93b-d1236ebd677e"/>
-    <PublishingExpirationDate xmlns="http://schemas.microsoft.com/sharepoint/v3" xsi:nil="true"/>
-    <PublishingStartDate xmlns="http://schemas.microsoft.com/sharepoint/v3" xsi:nil="true"/>
-    <TaxKeywordTaxHTField xmlns="230e9df3-be65-4c73-a93b-d1236ebd677e">
-      <Terms xmlns="http://schemas.microsoft.com/office/infopath/2007/PartnerControls"/>
-    </TaxKeywordTaxHTField>
-  </documentManagement>
-</p:properties>
-</file>
-
-<file path=customXml/item2.xml><?xml version="1.0" encoding="utf-8"?>
-<?mso-contentType ?>
-<FormTemplates xmlns="http://schemas.microsoft.com/sharepoint/v3/contenttype/forms">
-  <Display>DocumentLibraryForm</Display>
-  <Edit>DocumentLibraryForm</Edit>
-  <New>DocumentLibraryForm</New>
-</FormTemplates>
-</file>
-
-<file path=customXml/item3.xml><?xml version="1.0" encoding="utf-8"?>
 <ct:contentTypeSchema xmlns:ct="http://schemas.microsoft.com/office/2006/metadata/contentType" xmlns:ma="http://schemas.microsoft.com/office/2006/metadata/properties/metaAttributes" ct:_="" ma:_="" ma:contentTypeName="Document" ma:contentTypeID="0x010100496889825850D44592AC5D2F43187AE4" ma:contentTypeVersion="5" ma:contentTypeDescription="Create a new document." ma:contentTypeScope="" ma:versionID="fde90edb5a63ba841bca516fd2abaf95">
   <xsd:schema xmlns:xsd="http://www.w3.org/2001/XMLSchema" xmlns:xs="http://www.w3.org/2001/XMLSchema" xmlns:p="http://schemas.microsoft.com/office/2006/metadata/properties" xmlns:ns1="http://schemas.microsoft.com/sharepoint/v3" xmlns:ns2="230e9df3-be65-4c73-a93b-d1236ebd677e" xmlns:ns3="27aa9422-7f1f-4c84-9cdf-302b1a67e513" targetNamespace="http://schemas.microsoft.com/office/2006/metadata/properties" ma:root="true" ma:fieldsID="5e7808ae941cc340dbe51a3031959734" ns1:_="" ns2:_="" ns3:_="">
     <xsd:import namespace="http://schemas.microsoft.com/sharepoint/v3"/>
@@ -6242,33 +7664,29 @@
 </ct:contentTypeSchema>
 </file>
 
-<file path=customXml/itemProps1.xml><?xml version="1.0" encoding="utf-8"?>
-<ds:datastoreItem xmlns:ds="http://schemas.openxmlformats.org/officeDocument/2006/customXml" ds:itemID="{7025FDD9-4C58-4084-9F89-0E6ADD6FFF55}">
-  <ds:schemaRefs>
-    <ds:schemaRef ds:uri="27aa9422-7f1f-4c84-9cdf-302b1a67e513"/>
-    <ds:schemaRef ds:uri="http://schemas.microsoft.com/office/2006/documentManagement/types"/>
-    <ds:schemaRef ds:uri="http://schemas.microsoft.com/office/2006/metadata/properties"/>
-    <ds:schemaRef ds:uri="http://purl.org/dc/elements/1.1/"/>
-    <ds:schemaRef ds:uri="230e9df3-be65-4c73-a93b-d1236ebd677e"/>
-    <ds:schemaRef ds:uri="http://purl.org/dc/terms/"/>
-    <ds:schemaRef ds:uri="http://schemas.openxmlformats.org/package/2006/metadata/core-properties"/>
-    <ds:schemaRef ds:uri="http://purl.org/dc/dcmitype/"/>
-    <ds:schemaRef ds:uri="http://schemas.microsoft.com/office/infopath/2007/PartnerControls"/>
-    <ds:schemaRef ds:uri="http://schemas.microsoft.com/sharepoint/v3"/>
-    <ds:schemaRef ds:uri="http://www.w3.org/XML/1998/namespace"/>
-  </ds:schemaRefs>
-</ds:datastoreItem>
+<file path=customXml/item2.xml><?xml version="1.0" encoding="utf-8"?>
+<?mso-contentType ?>
+<FormTemplates xmlns="http://schemas.microsoft.com/sharepoint/v3/contenttype/forms">
+  <Display>DocumentLibraryForm</Display>
+  <Edit>DocumentLibraryForm</Edit>
+  <New>DocumentLibraryForm</New>
+</FormTemplates>
 </file>
 
-<file path=customXml/itemProps2.xml><?xml version="1.0" encoding="utf-8"?>
-<ds:datastoreItem xmlns:ds="http://schemas.openxmlformats.org/officeDocument/2006/customXml" ds:itemID="{B0CA13EC-1D3C-4D6F-8D1C-E8A452CFC79A}">
-  <ds:schemaRefs>
-    <ds:schemaRef ds:uri="http://schemas.microsoft.com/sharepoint/v3/contenttype/forms"/>
-  </ds:schemaRefs>
-</ds:datastoreItem>
+<file path=customXml/item3.xml><?xml version="1.0" encoding="utf-8"?>
+<p:properties xmlns:p="http://schemas.microsoft.com/office/2006/metadata/properties" xmlns:xsi="http://www.w3.org/2001/XMLSchema-instance" xmlns:pc="http://schemas.microsoft.com/office/infopath/2007/PartnerControls">
+  <documentManagement>
+    <TaxCatchAll xmlns="230e9df3-be65-4c73-a93b-d1236ebd677e"/>
+    <PublishingExpirationDate xmlns="http://schemas.microsoft.com/sharepoint/v3" xsi:nil="true"/>
+    <PublishingStartDate xmlns="http://schemas.microsoft.com/sharepoint/v3" xsi:nil="true"/>
+    <TaxKeywordTaxHTField xmlns="230e9df3-be65-4c73-a93b-d1236ebd677e">
+      <Terms xmlns="http://schemas.microsoft.com/office/infopath/2007/PartnerControls"/>
+    </TaxKeywordTaxHTField>
+  </documentManagement>
+</p:properties>
 </file>
 
-<file path=customXml/itemProps3.xml><?xml version="1.0" encoding="utf-8"?>
+<file path=customXml/itemProps1.xml><?xml version="1.0" encoding="utf-8"?>
 <ds:datastoreItem xmlns:ds="http://schemas.openxmlformats.org/officeDocument/2006/customXml" ds:itemID="{3253B29C-1CCD-4FE8-A1C4-023A0910DF96}">
   <ds:schemaRefs>
     <ds:schemaRef ds:uri="http://schemas.microsoft.com/office/2006/metadata/contentType"/>
@@ -6286,4 +7704,30 @@
     <ds:schemaRef ds:uri="http://schemas.microsoft.com/internal/obd"/>
   </ds:schemaRefs>
 </ds:datastoreItem>
+</file>
+
+<file path=customXml/itemProps2.xml><?xml version="1.0" encoding="utf-8"?>
+<ds:datastoreItem xmlns:ds="http://schemas.openxmlformats.org/officeDocument/2006/customXml" ds:itemID="{B0CA13EC-1D3C-4D6F-8D1C-E8A452CFC79A}">
+  <ds:schemaRefs>
+    <ds:schemaRef ds:uri="http://schemas.microsoft.com/sharepoint/v3/contenttype/forms"/>
+  </ds:schemaRefs>
+</ds:datastoreItem>
+</file>
+
+<file path=customXml/itemProps3.xml><?xml version="1.0" encoding="utf-8"?>
+<ds:datastoreItem xmlns:ds="http://schemas.openxmlformats.org/officeDocument/2006/customXml" ds:itemID="{7025FDD9-4C58-4084-9F89-0E6ADD6FFF55}">
+  <ds:schemaRefs>
+    <ds:schemaRef ds:uri="27aa9422-7f1f-4c84-9cdf-302b1a67e513"/>
+    <ds:schemaRef ds:uri="http://schemas.microsoft.com/office/2006/documentManagement/types"/>
+    <ds:schemaRef ds:uri="http://schemas.microsoft.com/office/2006/metadata/properties"/>
+    <ds:schemaRef ds:uri="http://purl.org/dc/elements/1.1/"/>
+    <ds:schemaRef ds:uri="230e9df3-be65-4c73-a93b-d1236ebd677e"/>
+    <ds:schemaRef ds:uri="http://purl.org/dc/terms/"/>
+    <ds:schemaRef ds:uri="http://schemas.openxmlformats.org/package/2006/metadata/core-properties"/>
+    <ds:schemaRef ds:uri="http://purl.org/dc/dcmitype/"/>
+    <ds:schemaRef ds:uri="http://schemas.microsoft.com/office/infopath/2007/PartnerControls"/>
+    <ds:schemaRef ds:uri="http://schemas.microsoft.com/sharepoint/v3"/>
+    <ds:schemaRef ds:uri="http://www.w3.org/XML/1998/namespace"/>
+  </ds:schemaRefs>
+</ds:datastoreItem>
 </file>
</xml_diff>